<commit_message>
Git_Github ppt 파일 수정
</commit_message>
<xml_diff>
--- a/CH00_Git_Github.pptx
+++ b/CH00_Git_Github.pptx
@@ -1582,7 +1582,7 @@
           <a:graphicData uri="http://schemas.openxmlformats.org/presentationml/2006/ole">
             <mc:AlternateContent xmlns:mc="http://schemas.openxmlformats.org/markup-compatibility/2006">
               <mc:Choice xmlns:v="urn:schemas-microsoft-com:vml" Requires="v">
-                <p:oleObj spid="_x0000_s4114" name="Image" r:id="rId5" imgW="8888760" imgH="7225200" progId="Photoshop.Image.16">
+                <p:oleObj spid="_x0000_s4118" name="Image" r:id="rId5" imgW="8888760" imgH="7225200" progId="Photoshop.Image.16">
                   <p:embed/>
                 </p:oleObj>
               </mc:Choice>
@@ -1729,7 +1729,7 @@
           <a:graphicData uri="http://schemas.openxmlformats.org/presentationml/2006/ole">
             <mc:AlternateContent xmlns:mc="http://schemas.openxmlformats.org/markup-compatibility/2006">
               <mc:Choice xmlns:v="urn:schemas-microsoft-com:vml" Requires="v">
-                <p:oleObj spid="_x0000_s5137" name="Image" r:id="rId3" imgW="7885440" imgH="5053680" progId="Photoshop.Image.16">
+                <p:oleObj spid="_x0000_s5141" name="Image" r:id="rId3" imgW="7885440" imgH="5053680" progId="Photoshop.Image.16">
                   <p:embed/>
                 </p:oleObj>
               </mc:Choice>
@@ -1798,28 +1798,14 @@
                 <a:latin typeface="+mj-ea"/>
                 <a:ea typeface="+mj-ea"/>
               </a:rPr>
-              <a:t>03- Github </a:t>
-            </a:r>
-            <a:r>
-              <a:rPr lang="en-US" altLang="ko-KR" sz="1292" smtClean="0">
-                <a:latin typeface="+mj-ea"/>
-                <a:ea typeface="+mj-ea"/>
-              </a:rPr>
-              <a:t>Local </a:t>
+              <a:t>03- Github Local </a:t>
             </a:r>
             <a:r>
               <a:rPr lang="ko-KR" altLang="en-US" sz="1292" smtClean="0">
                 <a:latin typeface="+mj-ea"/>
                 <a:ea typeface="+mj-ea"/>
               </a:rPr>
-              <a:t>저장소 </a:t>
-            </a:r>
-            <a:r>
-              <a:rPr lang="ko-KR" altLang="en-US" sz="1292" smtClean="0">
-                <a:latin typeface="+mj-ea"/>
-                <a:ea typeface="+mj-ea"/>
-              </a:rPr>
-              <a:t>만들기</a:t>
+              <a:t>저장소 만들기</a:t>
             </a:r>
             <a:endParaRPr lang="ko-KR" altLang="en-US" sz="1292">
               <a:latin typeface="+mj-ea"/>
@@ -2569,21 +2555,7 @@
                 <a:latin typeface="+mj-ea"/>
                 <a:ea typeface="+mj-ea"/>
               </a:rPr>
-              <a:t>04- </a:t>
-            </a:r>
-            <a:r>
-              <a:rPr lang="en-US" altLang="ko-KR" sz="1292" smtClean="0">
-                <a:latin typeface="+mj-ea"/>
-                <a:ea typeface="+mj-ea"/>
-              </a:rPr>
-              <a:t>Github </a:t>
-            </a:r>
-            <a:r>
-              <a:rPr lang="en-US" altLang="ko-KR" sz="1292" smtClean="0">
-                <a:latin typeface="+mj-ea"/>
-                <a:ea typeface="+mj-ea"/>
-              </a:rPr>
-              <a:t>Local </a:t>
+              <a:t>04- Github Local </a:t>
             </a:r>
             <a:r>
               <a:rPr lang="ko-KR" altLang="en-US" sz="1292" smtClean="0">
@@ -3471,14 +3443,7 @@
                 <a:latin typeface="나눔고딕" panose="020D0604000000000000" pitchFamily="50" charset="-127"/>
                 <a:ea typeface="나눔고딕" panose="020D0604000000000000" pitchFamily="50" charset="-127"/>
               </a:rPr>
-              <a:t>-</a:t>
-            </a:r>
-            <a:r>
-              <a:rPr lang="en-US" altLang="ko-KR" sz="900" b="1" smtClean="0">
-                <a:latin typeface="나눔고딕" panose="020D0604000000000000" pitchFamily="50" charset="-127"/>
-                <a:ea typeface="나눔고딕" panose="020D0604000000000000" pitchFamily="50" charset="-127"/>
-              </a:rPr>
-              <a:t>PPT,DOC,PSD,AI </a:t>
+              <a:t>-PPT,DOC,PSD,AI </a:t>
             </a:r>
             <a:r>
               <a:rPr lang="ko-KR" altLang="en-US" sz="900" b="1" smtClean="0">
@@ -3701,21 +3666,7 @@
                 <a:latin typeface="+mj-ea"/>
                 <a:ea typeface="+mj-ea"/>
               </a:rPr>
-              <a:t>04- </a:t>
-            </a:r>
-            <a:r>
-              <a:rPr lang="en-US" altLang="ko-KR" sz="1292" smtClean="0">
-                <a:latin typeface="+mj-ea"/>
-                <a:ea typeface="+mj-ea"/>
-              </a:rPr>
-              <a:t>Github </a:t>
-            </a:r>
-            <a:r>
-              <a:rPr lang="en-US" altLang="ko-KR" sz="1292" smtClean="0">
-                <a:latin typeface="+mj-ea"/>
-                <a:ea typeface="+mj-ea"/>
-              </a:rPr>
-              <a:t>Local </a:t>
+              <a:t>04- Github Local </a:t>
             </a:r>
             <a:r>
               <a:rPr lang="ko-KR" altLang="en-US" sz="1292" smtClean="0">
@@ -4279,14 +4230,7 @@
                 <a:latin typeface="나눔고딕" panose="020D0604000000000000" pitchFamily="50" charset="-127"/>
                 <a:ea typeface="나눔고딕" panose="020D0604000000000000" pitchFamily="50" charset="-127"/>
               </a:rPr>
-              <a:t>-</a:t>
-            </a:r>
-            <a:r>
-              <a:rPr lang="en-US" altLang="ko-KR" sz="900" b="1" smtClean="0">
-                <a:latin typeface="나눔고딕" panose="020D0604000000000000" pitchFamily="50" charset="-127"/>
-                <a:ea typeface="나눔고딕" panose="020D0604000000000000" pitchFamily="50" charset="-127"/>
-              </a:rPr>
-              <a:t>PPT,DOC,PSD,AI </a:t>
+              <a:t>-PPT,DOC,PSD,AI </a:t>
             </a:r>
             <a:r>
               <a:rPr lang="ko-KR" altLang="en-US" sz="900" b="1" smtClean="0">
@@ -4402,6 +4346,150 @@
               <a:t>.</a:t>
             </a:r>
             <a:endParaRPr lang="ko-KR" altLang="en-US" sz="900" b="1">
+              <a:latin typeface="나눔고딕" panose="020D0604000000000000" pitchFamily="50" charset="-127"/>
+              <a:ea typeface="나눔고딕" panose="020D0604000000000000" pitchFamily="50" charset="-127"/>
+            </a:endParaRPr>
+          </a:p>
+        </p:txBody>
+      </p:sp>
+      <p:sp>
+        <p:nvSpPr>
+          <p:cNvPr id="17" name="직사각형 16"/>
+          <p:cNvSpPr/>
+          <p:nvPr/>
+        </p:nvSpPr>
+        <p:spPr>
+          <a:xfrm>
+            <a:off x="6093619" y="2309813"/>
+            <a:ext cx="373856" cy="139453"/>
+          </a:xfrm>
+          <a:prstGeom prst="rect">
+            <a:avLst/>
+          </a:prstGeom>
+          <a:noFill/>
+          <a:ln w="12700">
+            <a:solidFill>
+              <a:srgbClr val="FF0000"/>
+            </a:solidFill>
+          </a:ln>
+        </p:spPr>
+        <p:style>
+          <a:lnRef idx="2">
+            <a:schemeClr val="accent1">
+              <a:shade val="50000"/>
+            </a:schemeClr>
+          </a:lnRef>
+          <a:fillRef idx="1">
+            <a:schemeClr val="accent1"/>
+          </a:fillRef>
+          <a:effectRef idx="0">
+            <a:schemeClr val="accent1"/>
+          </a:effectRef>
+          <a:fontRef idx="minor">
+            <a:schemeClr val="lt1"/>
+          </a:fontRef>
+        </p:style>
+        <p:txBody>
+          <a:bodyPr rtlCol="0" anchor="ctr"/>
+          <a:lstStyle/>
+          <a:p>
+            <a:pPr algn="ctr"/>
+            <a:endParaRPr lang="ko-KR" altLang="en-US"/>
+          </a:p>
+        </p:txBody>
+      </p:sp>
+      <p:cxnSp>
+        <p:nvCxnSpPr>
+          <p:cNvPr id="24" name="직선 화살표 연결선 23"/>
+          <p:cNvCxnSpPr/>
+          <p:nvPr/>
+        </p:nvCxnSpPr>
+        <p:spPr>
+          <a:xfrm>
+            <a:off x="6272213" y="2443163"/>
+            <a:ext cx="21431" cy="2528887"/>
+          </a:xfrm>
+          <a:prstGeom prst="straightConnector1">
+            <a:avLst/>
+          </a:prstGeom>
+          <a:ln w="12700">
+            <a:solidFill>
+              <a:srgbClr val="FF0000"/>
+            </a:solidFill>
+            <a:tailEnd type="triangle"/>
+          </a:ln>
+        </p:spPr>
+        <p:style>
+          <a:lnRef idx="1">
+            <a:schemeClr val="accent1"/>
+          </a:lnRef>
+          <a:fillRef idx="0">
+            <a:schemeClr val="accent1"/>
+          </a:fillRef>
+          <a:effectRef idx="0">
+            <a:schemeClr val="accent1"/>
+          </a:effectRef>
+          <a:fontRef idx="minor">
+            <a:schemeClr val="tx1"/>
+          </a:fontRef>
+        </p:style>
+      </p:cxnSp>
+      <p:sp>
+        <p:nvSpPr>
+          <p:cNvPr id="25" name="TextBox 24"/>
+          <p:cNvSpPr txBox="1"/>
+          <p:nvPr/>
+        </p:nvSpPr>
+        <p:spPr>
+          <a:xfrm>
+            <a:off x="5535490" y="5022058"/>
+            <a:ext cx="2058317" cy="369332"/>
+          </a:xfrm>
+          <a:prstGeom prst="rect">
+            <a:avLst/>
+          </a:prstGeom>
+          <a:noFill/>
+        </p:spPr>
+        <p:txBody>
+          <a:bodyPr wrap="square" rtlCol="0">
+            <a:spAutoFit/>
+          </a:bodyPr>
+          <a:lstStyle/>
+          <a:p>
+            <a:r>
+              <a:rPr lang="en-US" altLang="ko-KR" sz="900" b="1" smtClean="0">
+                <a:solidFill>
+                  <a:srgbClr val="C00000"/>
+                </a:solidFill>
+                <a:latin typeface="나눔고딕" panose="020D0604000000000000" pitchFamily="50" charset="-127"/>
+                <a:ea typeface="나눔고딕" panose="020D0604000000000000" pitchFamily="50" charset="-127"/>
+              </a:rPr>
+              <a:t>Revert </a:t>
+            </a:r>
+            <a:r>
+              <a:rPr lang="ko-KR" altLang="en-US" sz="900" b="1" smtClean="0">
+                <a:solidFill>
+                  <a:srgbClr val="C00000"/>
+                </a:solidFill>
+                <a:latin typeface="나눔고딕" panose="020D0604000000000000" pitchFamily="50" charset="-127"/>
+                <a:ea typeface="나눔고딕" panose="020D0604000000000000" pitchFamily="50" charset="-127"/>
+              </a:rPr>
+              <a:t>버튼을 클릭하면 이전 상태로 되돌린다</a:t>
+            </a:r>
+            <a:r>
+              <a:rPr lang="en-US" altLang="ko-KR" sz="900" b="1" smtClean="0">
+                <a:solidFill>
+                  <a:srgbClr val="C00000"/>
+                </a:solidFill>
+                <a:latin typeface="나눔고딕" panose="020D0604000000000000" pitchFamily="50" charset="-127"/>
+                <a:ea typeface="나눔고딕" panose="020D0604000000000000" pitchFamily="50" charset="-127"/>
+              </a:rPr>
+              <a:t>.</a:t>
+            </a:r>
+            <a:endParaRPr lang="ko-KR" altLang="en-US" sz="900" b="1">
+              <a:solidFill>
+                <a:srgbClr val="C00000"/>
+              </a:solidFill>
               <a:latin typeface="나눔고딕" panose="020D0604000000000000" pitchFamily="50" charset="-127"/>
               <a:ea typeface="나눔고딕" panose="020D0604000000000000" pitchFamily="50" charset="-127"/>
             </a:endParaRPr>
@@ -4447,6 +4535,56 @@
       </p:grpSpPr>
       <p:sp>
         <p:nvSpPr>
+          <p:cNvPr id="3" name="직사각형 2"/>
+          <p:cNvSpPr/>
+          <p:nvPr/>
+        </p:nvSpPr>
+        <p:spPr>
+          <a:xfrm>
+            <a:off x="585788" y="1621631"/>
+            <a:ext cx="4257675" cy="4179093"/>
+          </a:xfrm>
+          <a:prstGeom prst="rect">
+            <a:avLst/>
+          </a:prstGeom>
+          <a:solidFill>
+            <a:schemeClr val="bg1"/>
+          </a:solidFill>
+          <a:ln w="6350">
+            <a:solidFill>
+              <a:schemeClr val="bg1">
+                <a:lumMod val="75000"/>
+              </a:schemeClr>
+            </a:solidFill>
+          </a:ln>
+        </p:spPr>
+        <p:style>
+          <a:lnRef idx="2">
+            <a:schemeClr val="accent1">
+              <a:shade val="50000"/>
+            </a:schemeClr>
+          </a:lnRef>
+          <a:fillRef idx="1">
+            <a:schemeClr val="accent1"/>
+          </a:fillRef>
+          <a:effectRef idx="0">
+            <a:schemeClr val="accent1"/>
+          </a:effectRef>
+          <a:fontRef idx="minor">
+            <a:schemeClr val="lt1"/>
+          </a:fontRef>
+        </p:style>
+        <p:txBody>
+          <a:bodyPr rtlCol="0" anchor="ctr"/>
+          <a:lstStyle/>
+          <a:p>
+            <a:pPr algn="ctr"/>
+            <a:endParaRPr lang="ko-KR" altLang="en-US"/>
+          </a:p>
+        </p:txBody>
+      </p:sp>
+      <p:sp>
+        <p:nvSpPr>
           <p:cNvPr id="4" name="TextBox 3"/>
           <p:cNvSpPr txBox="1"/>
           <p:nvPr/>
@@ -4472,74 +4610,19 @@
                 <a:latin typeface="+mj-ea"/>
                 <a:ea typeface="+mj-ea"/>
               </a:rPr>
-              <a:t>02- Github </a:t>
+              <a:t>05- Git </a:t>
             </a:r>
             <a:r>
               <a:rPr lang="ko-KR" altLang="en-US" sz="1292" smtClean="0">
                 <a:latin typeface="+mj-ea"/>
                 <a:ea typeface="+mj-ea"/>
               </a:rPr>
-              <a:t>계정 등록하기</a:t>
+              <a:t>기본개념 및 이해</a:t>
             </a:r>
             <a:endParaRPr lang="ko-KR" altLang="en-US" sz="1292">
               <a:latin typeface="+mj-ea"/>
               <a:ea typeface="+mj-ea"/>
             </a:endParaRPr>
-          </a:p>
-        </p:txBody>
-      </p:sp>
-      <p:sp>
-        <p:nvSpPr>
-          <p:cNvPr id="35" name="TextBox 34"/>
-          <p:cNvSpPr txBox="1"/>
-          <p:nvPr/>
-        </p:nvSpPr>
-        <p:spPr>
-          <a:xfrm>
-            <a:off x="714670" y="1351883"/>
-            <a:ext cx="7571574" cy="446276"/>
-          </a:xfrm>
-          <a:prstGeom prst="rect">
-            <a:avLst/>
-          </a:prstGeom>
-          <a:noFill/>
-        </p:spPr>
-        <p:txBody>
-          <a:bodyPr wrap="square" rtlCol="0">
-            <a:spAutoFit/>
-          </a:bodyPr>
-          <a:lstStyle/>
-          <a:p>
-            <a:r>
-              <a:rPr lang="en-US" altLang="ko-KR" sz="1400" smtClean="0"/>
-              <a:t>1. </a:t>
-            </a:r>
-            <a:r>
-              <a:rPr lang="ko-KR" altLang="en-US" sz="1200" smtClean="0"/>
-              <a:t>아래 링크에서 자신의 시스템과 맞는 버전의 </a:t>
-            </a:r>
-            <a:r>
-              <a:rPr lang="en-US" altLang="ko-KR" sz="1200" smtClean="0"/>
-              <a:t>installer</a:t>
-            </a:r>
-            <a:r>
-              <a:rPr lang="ko-KR" altLang="en-US" sz="1200" smtClean="0"/>
-              <a:t>를 다운로드 한다</a:t>
-            </a:r>
-            <a:r>
-              <a:rPr lang="en-US" altLang="ko-KR" sz="1200" smtClean="0"/>
-              <a:t>.</a:t>
-            </a:r>
-            <a:br>
-              <a:rPr lang="en-US" altLang="ko-KR" sz="1200" smtClean="0"/>
-            </a:br>
-            <a:r>
-              <a:rPr lang="en-US" altLang="ko-KR" sz="900">
-                <a:hlinkClick r:id="rId2"/>
-              </a:rPr>
-              <a:t>https://git-scm.com/downloads</a:t>
-            </a:r>
-            <a:endParaRPr lang="ko-KR" altLang="en-US" sz="900"/>
           </a:p>
         </p:txBody>
       </p:sp>
@@ -4552,7 +4635,7 @@
           <p:nvPr/>
         </p:nvPicPr>
         <p:blipFill>
-          <a:blip r:embed="rId3">
+          <a:blip r:embed="rId2">
             <a:extLst>
               <a:ext uri="{28A0092B-C50C-407E-A947-70E740481C1C}">
                 <a14:useLocalDpi xmlns:a14="http://schemas.microsoft.com/office/drawing/2010/main" val="0"/>
@@ -4566,8 +4649,8 @@
         </p:blipFill>
         <p:spPr bwMode="auto">
           <a:xfrm>
-            <a:off x="2275200" y="1791750"/>
-            <a:ext cx="4023750" cy="3701850"/>
+            <a:off x="853593" y="1963201"/>
+            <a:ext cx="3696976" cy="3401218"/>
           </a:xfrm>
           <a:prstGeom prst="rect">
             <a:avLst/>
@@ -4599,14 +4682,14 @@
       </p:pic>
       <p:sp>
         <p:nvSpPr>
-          <p:cNvPr id="2" name="TextBox 1"/>
+          <p:cNvPr id="11" name="TextBox 10"/>
           <p:cNvSpPr txBox="1"/>
           <p:nvPr/>
         </p:nvSpPr>
         <p:spPr>
           <a:xfrm>
-            <a:off x="691200" y="4024800"/>
-            <a:ext cx="1684800" cy="369332"/>
+            <a:off x="4993482" y="1709738"/>
+            <a:ext cx="3593306" cy="2677656"/>
           </a:xfrm>
           <a:prstGeom prst="rect">
             <a:avLst/>
@@ -4619,64 +4702,238 @@
           </a:bodyPr>
           <a:lstStyle/>
           <a:p>
-            <a:pPr algn="r"/>
-            <a:r>
-              <a:rPr lang="en-US" altLang="ko-KR" smtClean="0"/>
-              <a:t>git add</a:t>
-            </a:r>
-            <a:endParaRPr lang="ko-KR" altLang="en-US"/>
+            <a:r>
+              <a:rPr lang="en-US" altLang="ko-KR" sz="1050"/>
+              <a:t>Git</a:t>
+            </a:r>
+            <a:r>
+              <a:rPr lang="ko-KR" altLang="en-US" sz="1050"/>
+              <a:t>은 파일을 </a:t>
+            </a:r>
+            <a:r>
+              <a:rPr lang="en-US" altLang="ko-KR" sz="1050"/>
+              <a:t>Committed, Modified, Staged </a:t>
+            </a:r>
+            <a:r>
+              <a:rPr lang="ko-KR" altLang="en-US" sz="1050"/>
+              <a:t>이렇게 세가지 상태로 </a:t>
+            </a:r>
+            <a:r>
+              <a:rPr lang="ko-KR" altLang="en-US" sz="1050"/>
+              <a:t>관리한다</a:t>
+            </a:r>
+            <a:r>
+              <a:rPr lang="en-US" altLang="ko-KR" sz="1050" smtClean="0"/>
+              <a:t>.</a:t>
+            </a:r>
+            <a:br>
+              <a:rPr lang="en-US" altLang="ko-KR" sz="1050" smtClean="0"/>
+            </a:br>
+            <a:endParaRPr lang="en-US" altLang="ko-KR" sz="1050"/>
+          </a:p>
+          <a:p>
+            <a:pPr marL="171450" indent="-171450">
+              <a:buFont typeface="Arial" panose="020B0604020202020204" pitchFamily="34" charset="0"/>
+              <a:buChar char="•"/>
+            </a:pPr>
+            <a:r>
+              <a:rPr lang="en-US" altLang="ko-KR" sz="1050">
+                <a:solidFill>
+                  <a:srgbClr val="00B0F0"/>
+                </a:solidFill>
+              </a:rPr>
+              <a:t>Commited</a:t>
+            </a:r>
+            <a:r>
+              <a:rPr lang="en-US" altLang="ko-KR" sz="1050"/>
+              <a:t> - </a:t>
+            </a:r>
+            <a:r>
+              <a:rPr lang="ko-KR" altLang="en-US" sz="1050"/>
+              <a:t>데이터가 로컬 저장소에 안전하게 저장됐다는 것을 의미한다</a:t>
+            </a:r>
+            <a:r>
+              <a:rPr lang="en-US" altLang="ko-KR" sz="1050"/>
+              <a:t>.</a:t>
+            </a:r>
+          </a:p>
+          <a:p>
+            <a:pPr marL="171450" indent="-171450">
+              <a:buFont typeface="Arial" panose="020B0604020202020204" pitchFamily="34" charset="0"/>
+              <a:buChar char="•"/>
+            </a:pPr>
+            <a:r>
+              <a:rPr lang="en-US" altLang="ko-KR" sz="1050">
+                <a:solidFill>
+                  <a:srgbClr val="00B0F0"/>
+                </a:solidFill>
+              </a:rPr>
+              <a:t>Modified</a:t>
+            </a:r>
+            <a:r>
+              <a:rPr lang="en-US" altLang="ko-KR" sz="1050"/>
+              <a:t> - </a:t>
+            </a:r>
+            <a:r>
+              <a:rPr lang="ko-KR" altLang="en-US" sz="1050"/>
+              <a:t>수정한 파일을 아직 로컬 저장소에 커밋하지 않은 것을 말한다</a:t>
+            </a:r>
+            <a:r>
+              <a:rPr lang="en-US" altLang="ko-KR" sz="1050"/>
+              <a:t>.</a:t>
+            </a:r>
+          </a:p>
+          <a:p>
+            <a:pPr marL="171450" indent="-171450">
+              <a:buFont typeface="Arial" panose="020B0604020202020204" pitchFamily="34" charset="0"/>
+              <a:buChar char="•"/>
+            </a:pPr>
+            <a:r>
+              <a:rPr lang="en-US" altLang="ko-KR" sz="1050">
+                <a:solidFill>
+                  <a:srgbClr val="00B0F0"/>
+                </a:solidFill>
+              </a:rPr>
+              <a:t>Staged</a:t>
+            </a:r>
+            <a:r>
+              <a:rPr lang="en-US" altLang="ko-KR" sz="1050"/>
+              <a:t> - </a:t>
+            </a:r>
+            <a:r>
+              <a:rPr lang="ko-KR" altLang="en-US" sz="1050"/>
+              <a:t>현재 수정한 파일을 곧 커밋할 것이라고 표시한 상태를 </a:t>
+            </a:r>
+            <a:r>
+              <a:rPr lang="ko-KR" altLang="en-US" sz="1050"/>
+              <a:t>의미한다</a:t>
+            </a:r>
+            <a:r>
+              <a:rPr lang="en-US" altLang="ko-KR" sz="1050" smtClean="0"/>
+              <a:t>.</a:t>
+            </a:r>
+            <a:br>
+              <a:rPr lang="en-US" altLang="ko-KR" sz="1050" smtClean="0"/>
+            </a:br>
+            <a:endParaRPr lang="en-US" altLang="ko-KR" sz="1050"/>
+          </a:p>
+          <a:p>
+            <a:r>
+              <a:rPr lang="en-US" altLang="ko-KR" sz="1050"/>
+              <a:t>Git </a:t>
+            </a:r>
+            <a:r>
+              <a:rPr lang="ko-KR" altLang="en-US" sz="1050"/>
+              <a:t>디렉토리에 있는 파일들은 </a:t>
+            </a:r>
+            <a:r>
+              <a:rPr lang="en-US" altLang="ko-KR" sz="1050"/>
+              <a:t>Committed </a:t>
+            </a:r>
+            <a:r>
+              <a:rPr lang="ko-KR" altLang="en-US" sz="1050"/>
+              <a:t>상태이다</a:t>
+            </a:r>
+            <a:r>
+              <a:rPr lang="en-US" altLang="ko-KR" sz="1050"/>
+              <a:t>. </a:t>
+            </a:r>
+            <a:r>
+              <a:rPr lang="ko-KR" altLang="en-US" sz="1050"/>
+              <a:t>파일을 수정하고 </a:t>
+            </a:r>
+            <a:r>
+              <a:rPr lang="en-US" altLang="ko-KR" sz="1050"/>
+              <a:t>Staging Area</a:t>
+            </a:r>
+            <a:r>
+              <a:rPr lang="ko-KR" altLang="en-US" sz="1050"/>
+              <a:t>에 추가했다면 </a:t>
+            </a:r>
+            <a:r>
+              <a:rPr lang="en-US" altLang="ko-KR" sz="1050"/>
+              <a:t>Staged</a:t>
+            </a:r>
+            <a:r>
+              <a:rPr lang="ko-KR" altLang="en-US" sz="1050"/>
+              <a:t>이다</a:t>
+            </a:r>
+            <a:r>
+              <a:rPr lang="en-US" altLang="ko-KR" sz="1050"/>
+              <a:t>. </a:t>
+            </a:r>
+            <a:r>
+              <a:rPr lang="ko-KR" altLang="en-US" sz="1050"/>
+              <a:t>그리고 </a:t>
+            </a:r>
+            <a:r>
+              <a:rPr lang="en-US" altLang="ko-KR" sz="1050"/>
+              <a:t>Checkout</a:t>
+            </a:r>
+            <a:r>
+              <a:rPr lang="ko-KR" altLang="en-US" sz="1050"/>
+              <a:t>하고 나서 수정했지만</a:t>
+            </a:r>
+            <a:r>
+              <a:rPr lang="en-US" altLang="ko-KR" sz="1050"/>
+              <a:t>, </a:t>
+            </a:r>
+            <a:r>
+              <a:rPr lang="ko-KR" altLang="en-US" sz="1050"/>
+              <a:t>아직 </a:t>
+            </a:r>
+            <a:r>
+              <a:rPr lang="en-US" altLang="ko-KR" sz="1050"/>
+              <a:t>Staging Area</a:t>
+            </a:r>
+            <a:r>
+              <a:rPr lang="ko-KR" altLang="en-US" sz="1050"/>
+              <a:t>에 추가하지 않았다면 </a:t>
+            </a:r>
+            <a:r>
+              <a:rPr lang="en-US" altLang="ko-KR" sz="1050"/>
+              <a:t>Modified</a:t>
+            </a:r>
+            <a:r>
+              <a:rPr lang="ko-KR" altLang="en-US" sz="1050"/>
+              <a:t>이다</a:t>
+            </a:r>
+            <a:r>
+              <a:rPr lang="en-US" altLang="ko-KR" sz="1050"/>
+              <a:t>.</a:t>
+            </a:r>
+          </a:p>
+          <a:p>
+            <a:r>
+              <a:rPr lang="en-US" altLang="ko-KR" sz="1050" b="1" smtClean="0">
+                <a:latin typeface="나눔고딕" panose="020D0604000000000000" pitchFamily="50" charset="-127"/>
+                <a:ea typeface="나눔고딕" panose="020D0604000000000000" pitchFamily="50" charset="-127"/>
+              </a:rPr>
+              <a:t/>
+            </a:r>
+            <a:br>
+              <a:rPr lang="en-US" altLang="ko-KR" sz="1050" b="1" smtClean="0">
+                <a:latin typeface="나눔고딕" panose="020D0604000000000000" pitchFamily="50" charset="-127"/>
+                <a:ea typeface="나눔고딕" panose="020D0604000000000000" pitchFamily="50" charset="-127"/>
+              </a:rPr>
+            </a:br>
+            <a:endParaRPr lang="ko-KR" altLang="en-US" sz="1050" b="1">
+              <a:latin typeface="나눔고딕" panose="020D0604000000000000" pitchFamily="50" charset="-127"/>
+              <a:ea typeface="나눔고딕" panose="020D0604000000000000" pitchFamily="50" charset="-127"/>
+            </a:endParaRPr>
           </a:p>
         </p:txBody>
       </p:sp>
-      <p:cxnSp>
-        <p:nvCxnSpPr>
-          <p:cNvPr id="10" name="직선 화살표 연결선 9"/>
-          <p:cNvCxnSpPr/>
-          <p:nvPr/>
-        </p:nvCxnSpPr>
-        <p:spPr>
-          <a:xfrm>
-            <a:off x="2376000" y="4219200"/>
-            <a:ext cx="374400" cy="0"/>
-          </a:xfrm>
-          <a:prstGeom prst="straightConnector1">
-            <a:avLst/>
-          </a:prstGeom>
-          <a:ln>
-            <a:solidFill>
-              <a:schemeClr val="tx1">
-                <a:lumMod val="75000"/>
-                <a:lumOff val="25000"/>
-              </a:schemeClr>
-            </a:solidFill>
-            <a:tailEnd type="triangle"/>
-          </a:ln>
-        </p:spPr>
-        <p:style>
-          <a:lnRef idx="1">
-            <a:schemeClr val="accent1"/>
-          </a:lnRef>
-          <a:fillRef idx="0">
-            <a:schemeClr val="accent1"/>
-          </a:fillRef>
-          <a:effectRef idx="0">
-            <a:schemeClr val="accent1"/>
-          </a:effectRef>
-          <a:fontRef idx="minor">
-            <a:schemeClr val="tx1"/>
-          </a:fontRef>
-        </p:style>
-      </p:cxnSp>
       <p:sp>
         <p:nvSpPr>
-          <p:cNvPr id="16" name="TextBox 15"/>
+          <p:cNvPr id="12" name="TextBox 11"/>
           <p:cNvSpPr txBox="1"/>
           <p:nvPr/>
         </p:nvSpPr>
         <p:spPr>
           <a:xfrm>
-            <a:off x="692400" y="4803600"/>
-            <a:ext cx="1684800" cy="369332"/>
+            <a:off x="556730" y="1214055"/>
+            <a:ext cx="4223770" cy="313332"/>
           </a:xfrm>
           <a:prstGeom prst="rect">
             <a:avLst/>
@@ -4684,59 +4941,25 @@
           <a:noFill/>
         </p:spPr>
         <p:txBody>
-          <a:bodyPr wrap="square" rtlCol="0">
+          <a:bodyPr wrap="square" lIns="33231" tIns="33231" rIns="33231" bIns="33231" rtlCol="0">
             <a:spAutoFit/>
           </a:bodyPr>
           <a:lstStyle/>
           <a:p>
-            <a:pPr algn="r"/>
-            <a:r>
-              <a:rPr lang="en-US" altLang="ko-KR" smtClean="0"/>
-              <a:t>git commit</a:t>
-            </a:r>
-            <a:endParaRPr lang="ko-KR" altLang="en-US"/>
+            <a:r>
+              <a:rPr lang="ko-KR" altLang="en-US" sz="1600" b="1" smtClean="0">
+                <a:latin typeface="나눔고딕" panose="020D0604000000000000" pitchFamily="50" charset="-127"/>
+                <a:ea typeface="나눔고딕" panose="020D0604000000000000" pitchFamily="50" charset="-127"/>
+              </a:rPr>
+              <a:t>작업흐름</a:t>
+            </a:r>
+            <a:endParaRPr lang="ko-KR" altLang="en-US" sz="1600" b="1">
+              <a:latin typeface="나눔고딕" panose="020D0604000000000000" pitchFamily="50" charset="-127"/>
+              <a:ea typeface="나눔고딕" panose="020D0604000000000000" pitchFamily="50" charset="-127"/>
+            </a:endParaRPr>
           </a:p>
         </p:txBody>
       </p:sp>
-      <p:cxnSp>
-        <p:nvCxnSpPr>
-          <p:cNvPr id="17" name="직선 화살표 연결선 16"/>
-          <p:cNvCxnSpPr/>
-          <p:nvPr/>
-        </p:nvCxnSpPr>
-        <p:spPr>
-          <a:xfrm>
-            <a:off x="2377200" y="4998000"/>
-            <a:ext cx="1784400" cy="0"/>
-          </a:xfrm>
-          <a:prstGeom prst="straightConnector1">
-            <a:avLst/>
-          </a:prstGeom>
-          <a:ln>
-            <a:solidFill>
-              <a:schemeClr val="tx1">
-                <a:lumMod val="75000"/>
-                <a:lumOff val="25000"/>
-              </a:schemeClr>
-            </a:solidFill>
-            <a:tailEnd type="triangle"/>
-          </a:ln>
-        </p:spPr>
-        <p:style>
-          <a:lnRef idx="1">
-            <a:schemeClr val="accent1"/>
-          </a:lnRef>
-          <a:fillRef idx="0">
-            <a:schemeClr val="accent1"/>
-          </a:fillRef>
-          <a:effectRef idx="0">
-            <a:schemeClr val="accent1"/>
-          </a:effectRef>
-          <a:fontRef idx="minor">
-            <a:schemeClr val="tx1"/>
-          </a:fontRef>
-        </p:style>
-      </p:cxnSp>
     </p:spTree>
     <p:extLst>
       <p:ext uri="{BB962C8B-B14F-4D97-AF65-F5344CB8AC3E}">

</xml_diff>